<commit_message>
Updating UXF_UI_controllScript 1) add support for WebGL experiments. 2) fix bug that the script still tries to change a component even if it is not enabled. Now a component is skipped when the field is set to "" in the .json. 3) added new field to study dict to also allow download of UI .jsons. 4) fixed bug that UXF script doesn't work if [UXF_Rig] is set inactive by the FPS counter. This was done by changing the sort order and remove the corresponding line in the FPS script. 5) the script also handles other necessary changes of the UI for local vs. web experiments (mainly setting jsonURL). 6) study ID and UXF_settings_url are log to the session
</commit_message>
<xml_diff>
--- a/nonUnity_folder/WebGL_studyID_logic_explanation.pptx
+++ b/nonUnity_folder/WebGL_studyID_logic_explanation.pptx
@@ -259,7 +259,7 @@
           <a:p>
             <a:fld id="{8E7BAE6E-3D98-4F70-AB27-47D8CAB85D53}" type="datetimeFigureOut">
               <a:rPr lang="en-GB" smtClean="0"/>
-              <a:t>13/08/2024</a:t>
+              <a:t>14/08/2024</a:t>
             </a:fld>
             <a:endParaRPr lang="en-GB"/>
           </a:p>
@@ -457,7 +457,7 @@
           <a:p>
             <a:fld id="{8E7BAE6E-3D98-4F70-AB27-47D8CAB85D53}" type="datetimeFigureOut">
               <a:rPr lang="en-GB" smtClean="0"/>
-              <a:t>13/08/2024</a:t>
+              <a:t>14/08/2024</a:t>
             </a:fld>
             <a:endParaRPr lang="en-GB"/>
           </a:p>
@@ -665,7 +665,7 @@
           <a:p>
             <a:fld id="{8E7BAE6E-3D98-4F70-AB27-47D8CAB85D53}" type="datetimeFigureOut">
               <a:rPr lang="en-GB" smtClean="0"/>
-              <a:t>13/08/2024</a:t>
+              <a:t>14/08/2024</a:t>
             </a:fld>
             <a:endParaRPr lang="en-GB"/>
           </a:p>
@@ -863,7 +863,7 @@
           <a:p>
             <a:fld id="{8E7BAE6E-3D98-4F70-AB27-47D8CAB85D53}" type="datetimeFigureOut">
               <a:rPr lang="en-GB" smtClean="0"/>
-              <a:t>13/08/2024</a:t>
+              <a:t>14/08/2024</a:t>
             </a:fld>
             <a:endParaRPr lang="en-GB"/>
           </a:p>
@@ -1138,7 +1138,7 @@
           <a:p>
             <a:fld id="{8E7BAE6E-3D98-4F70-AB27-47D8CAB85D53}" type="datetimeFigureOut">
               <a:rPr lang="en-GB" smtClean="0"/>
-              <a:t>13/08/2024</a:t>
+              <a:t>14/08/2024</a:t>
             </a:fld>
             <a:endParaRPr lang="en-GB"/>
           </a:p>
@@ -1403,7 +1403,7 @@
           <a:p>
             <a:fld id="{8E7BAE6E-3D98-4F70-AB27-47D8CAB85D53}" type="datetimeFigureOut">
               <a:rPr lang="en-GB" smtClean="0"/>
-              <a:t>13/08/2024</a:t>
+              <a:t>14/08/2024</a:t>
             </a:fld>
             <a:endParaRPr lang="en-GB"/>
           </a:p>
@@ -1815,7 +1815,7 @@
           <a:p>
             <a:fld id="{8E7BAE6E-3D98-4F70-AB27-47D8CAB85D53}" type="datetimeFigureOut">
               <a:rPr lang="en-GB" smtClean="0"/>
-              <a:t>13/08/2024</a:t>
+              <a:t>14/08/2024</a:t>
             </a:fld>
             <a:endParaRPr lang="en-GB"/>
           </a:p>
@@ -1956,7 +1956,7 @@
           <a:p>
             <a:fld id="{8E7BAE6E-3D98-4F70-AB27-47D8CAB85D53}" type="datetimeFigureOut">
               <a:rPr lang="en-GB" smtClean="0"/>
-              <a:t>13/08/2024</a:t>
+              <a:t>14/08/2024</a:t>
             </a:fld>
             <a:endParaRPr lang="en-GB"/>
           </a:p>
@@ -2069,7 +2069,7 @@
           <a:p>
             <a:fld id="{8E7BAE6E-3D98-4F70-AB27-47D8CAB85D53}" type="datetimeFigureOut">
               <a:rPr lang="en-GB" smtClean="0"/>
-              <a:t>13/08/2024</a:t>
+              <a:t>14/08/2024</a:t>
             </a:fld>
             <a:endParaRPr lang="en-GB"/>
           </a:p>
@@ -2380,7 +2380,7 @@
           <a:p>
             <a:fld id="{8E7BAE6E-3D98-4F70-AB27-47D8CAB85D53}" type="datetimeFigureOut">
               <a:rPr lang="en-GB" smtClean="0"/>
-              <a:t>13/08/2024</a:t>
+              <a:t>14/08/2024</a:t>
             </a:fld>
             <a:endParaRPr lang="en-GB"/>
           </a:p>
@@ -2668,7 +2668,7 @@
           <a:p>
             <a:fld id="{8E7BAE6E-3D98-4F70-AB27-47D8CAB85D53}" type="datetimeFigureOut">
               <a:rPr lang="en-GB" smtClean="0"/>
-              <a:t>13/08/2024</a:t>
+              <a:t>14/08/2024</a:t>
             </a:fld>
             <a:endParaRPr lang="en-GB"/>
           </a:p>
@@ -2909,7 +2909,7 @@
           <a:p>
             <a:fld id="{8E7BAE6E-3D98-4F70-AB27-47D8CAB85D53}" type="datetimeFigureOut">
               <a:rPr lang="en-GB" smtClean="0"/>
-              <a:t>13/08/2024</a:t>
+              <a:t>14/08/2024</a:t>
             </a:fld>
             <a:endParaRPr lang="en-GB"/>
           </a:p>
@@ -3757,7 +3757,7 @@
         </p:nvSpPr>
         <p:spPr>
           <a:xfrm>
-            <a:off x="6386947" y="3367696"/>
+            <a:off x="6424355" y="2495209"/>
             <a:ext cx="835429" cy="511233"/>
           </a:xfrm>
           <a:prstGeom prst="roundRect">
@@ -3806,7 +3806,7 @@
         </p:nvSpPr>
         <p:spPr>
           <a:xfrm>
-            <a:off x="8373689" y="3367696"/>
+            <a:off x="8460971" y="3111390"/>
             <a:ext cx="835429" cy="511233"/>
           </a:xfrm>
           <a:prstGeom prst="roundRect">
@@ -4085,7 +4085,7 @@
             <a:pPr algn="ctr"/>
             <a:r>
               <a:rPr lang="en-GB" sz="800" dirty="0"/>
-              <a:t>Download file from via the internet.</a:t>
+              <a:t>Download files from via the internet.</a:t>
             </a:r>
           </a:p>
         </p:txBody>
@@ -4140,8 +4140,8 @@
         </p:nvSpPr>
         <p:spPr>
           <a:xfrm>
-            <a:off x="7240386" y="3628504"/>
-            <a:ext cx="1084811" cy="584775"/>
+            <a:off x="7281949" y="3645131"/>
+            <a:ext cx="1255222" cy="584775"/>
           </a:xfrm>
           <a:prstGeom prst="rect">
             <a:avLst/>
@@ -4156,9 +4156,10 @@
           <a:p>
             <a:pPr algn="ctr"/>
             <a:r>
-              <a:rPr lang="en-GB" sz="800" b="1" dirty="0"/>
-              <a:t>Prepare_Exp.cs</a:t>
-            </a:r>
+              <a:rPr lang="en-GB" sz="800" b="1" dirty="0" err="1"/>
+              <a:t>UXF_UI_controllScript.cs</a:t>
+            </a:r>
+            <a:endParaRPr lang="en-GB" sz="800" b="1" dirty="0"/>
           </a:p>
           <a:p>
             <a:pPr algn="ctr"/>
@@ -4283,9 +4284,9 @@
           <p:nvPr/>
         </p:nvCxnSpPr>
         <p:spPr>
-          <a:xfrm>
-            <a:off x="5534892" y="2766928"/>
-            <a:ext cx="852055" cy="856385"/>
+          <a:xfrm flipV="1">
+            <a:off x="5534892" y="2750826"/>
+            <a:ext cx="889463" cy="16102"/>
           </a:xfrm>
           <a:prstGeom prst="straightConnector1">
             <a:avLst/>
@@ -4518,15 +4519,65 @@
             </a:extLst>
           </p:cNvPr>
           <p:cNvCxnSpPr>
+            <a:cxnSpLocks/>
             <a:stCxn id="15" idx="3"/>
-            <a:endCxn id="16" idx="1"/>
+            <a:endCxn id="2" idx="1"/>
           </p:cNvCxnSpPr>
           <p:nvPr/>
         </p:nvCxnSpPr>
         <p:spPr>
           <a:xfrm>
-            <a:off x="7222376" y="3623313"/>
-            <a:ext cx="1151313" cy="0"/>
+            <a:off x="7259784" y="2750826"/>
+            <a:ext cx="1212270" cy="0"/>
+          </a:xfrm>
+          <a:prstGeom prst="straightConnector1">
+            <a:avLst/>
+          </a:prstGeom>
+          <a:ln>
+            <a:solidFill>
+              <a:schemeClr val="tx1">
+                <a:lumMod val="95000"/>
+                <a:lumOff val="5000"/>
+              </a:schemeClr>
+            </a:solidFill>
+            <a:tailEnd type="triangle"/>
+          </a:ln>
+        </p:spPr>
+        <p:style>
+          <a:lnRef idx="1">
+            <a:schemeClr val="accent1"/>
+          </a:lnRef>
+          <a:fillRef idx="0">
+            <a:schemeClr val="accent1"/>
+          </a:fillRef>
+          <a:effectRef idx="0">
+            <a:schemeClr val="accent1"/>
+          </a:effectRef>
+          <a:fontRef idx="minor">
+            <a:schemeClr val="tx1"/>
+          </a:fontRef>
+        </p:style>
+      </p:cxnSp>
+      <p:cxnSp>
+        <p:nvCxnSpPr>
+          <p:cNvPr id="8" name="Straight Arrow Connector 7">
+            <a:extLst>
+              <a:ext uri="{FF2B5EF4-FFF2-40B4-BE49-F238E27FC236}">
+                <a16:creationId xmlns:a16="http://schemas.microsoft.com/office/drawing/2014/main" id="{6314BB30-8734-2718-F4C1-CCABE6A6C07D}"/>
+              </a:ext>
+            </a:extLst>
+          </p:cNvPr>
+          <p:cNvCxnSpPr>
+            <a:cxnSpLocks/>
+            <a:stCxn id="10" idx="0"/>
+            <a:endCxn id="12" idx="2"/>
+          </p:cNvCxnSpPr>
+          <p:nvPr/>
+        </p:nvCxnSpPr>
+        <p:spPr>
+          <a:xfrm flipV="1">
+            <a:off x="4078692" y="3878929"/>
+            <a:ext cx="0" cy="761765"/>
           </a:xfrm>
           <a:prstGeom prst="straightConnector1">
             <a:avLst/>
@@ -4558,10 +4609,10 @@
       </p:cxnSp>
       <p:pic>
         <p:nvPicPr>
-          <p:cNvPr id="3" name="Picture 2">
-            <a:extLst>
-              <a:ext uri="{FF2B5EF4-FFF2-40B4-BE49-F238E27FC236}">
-                <a16:creationId xmlns:a16="http://schemas.microsoft.com/office/drawing/2014/main" id="{159EDD91-CE84-956F-9DA2-D71BF82BA4D8}"/>
+          <p:cNvPr id="10" name="Picture 9">
+            <a:extLst>
+              <a:ext uri="{FF2B5EF4-FFF2-40B4-BE49-F238E27FC236}">
+                <a16:creationId xmlns:a16="http://schemas.microsoft.com/office/drawing/2014/main" id="{AB25A537-E538-8BEB-6650-F5230402429C}"/>
               </a:ext>
             </a:extLst>
           </p:cNvPr>
@@ -4578,34 +4629,181 @@
         </p:blipFill>
         <p:spPr>
           <a:xfrm>
-            <a:off x="2392506" y="4473604"/>
-            <a:ext cx="3372370" cy="1008378"/>
+            <a:off x="2175077" y="4640694"/>
+            <a:ext cx="3807229" cy="777999"/>
           </a:xfrm>
           <a:prstGeom prst="rect">
             <a:avLst/>
           </a:prstGeom>
         </p:spPr>
       </p:pic>
+      <p:sp>
+        <p:nvSpPr>
+          <p:cNvPr id="2" name="Rectangle: Rounded Corners 1">
+            <a:extLst>
+              <a:ext uri="{FF2B5EF4-FFF2-40B4-BE49-F238E27FC236}">
+                <a16:creationId xmlns:a16="http://schemas.microsoft.com/office/drawing/2014/main" id="{3D26929B-65E8-147F-1A09-317FA28F849E}"/>
+              </a:ext>
+            </a:extLst>
+          </p:cNvPr>
+          <p:cNvSpPr/>
+          <p:nvPr/>
+        </p:nvSpPr>
+        <p:spPr>
+          <a:xfrm>
+            <a:off x="8472054" y="2495209"/>
+            <a:ext cx="835429" cy="511233"/>
+          </a:xfrm>
+          <a:prstGeom prst="roundRect">
+            <a:avLst/>
+          </a:prstGeom>
+        </p:spPr>
+        <p:style>
+          <a:lnRef idx="2">
+            <a:schemeClr val="accent3">
+              <a:shade val="15000"/>
+            </a:schemeClr>
+          </a:lnRef>
+          <a:fillRef idx="1">
+            <a:schemeClr val="accent3"/>
+          </a:fillRef>
+          <a:effectRef idx="0">
+            <a:schemeClr val="accent3"/>
+          </a:effectRef>
+          <a:fontRef idx="minor">
+            <a:schemeClr val="lt1"/>
+          </a:fontRef>
+        </p:style>
+        <p:txBody>
+          <a:bodyPr rtlCol="0" anchor="ctr"/>
+          <a:lstStyle/>
+          <a:p>
+            <a:pPr algn="ctr"/>
+            <a:r>
+              <a:rPr lang="en-GB" sz="1000" dirty="0"/>
+              <a:t>Experiment settings</a:t>
+            </a:r>
+          </a:p>
+        </p:txBody>
+      </p:sp>
+      <p:sp>
+        <p:nvSpPr>
+          <p:cNvPr id="23" name="Rectangle: Rounded Corners 22">
+            <a:extLst>
+              <a:ext uri="{FF2B5EF4-FFF2-40B4-BE49-F238E27FC236}">
+                <a16:creationId xmlns:a16="http://schemas.microsoft.com/office/drawing/2014/main" id="{D12EACB4-FFD2-B5FB-8CFE-681AAEB6A99B}"/>
+              </a:ext>
+            </a:extLst>
+          </p:cNvPr>
+          <p:cNvSpPr/>
+          <p:nvPr/>
+        </p:nvSpPr>
+        <p:spPr>
+          <a:xfrm>
+            <a:off x="6447907" y="3111390"/>
+            <a:ext cx="835429" cy="511233"/>
+          </a:xfrm>
+          <a:prstGeom prst="roundRect">
+            <a:avLst/>
+          </a:prstGeom>
+        </p:spPr>
+        <p:style>
+          <a:lnRef idx="2">
+            <a:schemeClr val="accent3">
+              <a:shade val="15000"/>
+            </a:schemeClr>
+          </a:lnRef>
+          <a:fillRef idx="1">
+            <a:schemeClr val="accent3"/>
+          </a:fillRef>
+          <a:effectRef idx="0">
+            <a:schemeClr val="accent3"/>
+          </a:effectRef>
+          <a:fontRef idx="minor">
+            <a:schemeClr val="lt1"/>
+          </a:fontRef>
+        </p:style>
+        <p:txBody>
+          <a:bodyPr rtlCol="0" anchor="ctr"/>
+          <a:lstStyle/>
+          <a:p>
+            <a:pPr algn="ctr"/>
+            <a:r>
+              <a:rPr lang="en-GB" sz="1000" dirty="0"/>
+              <a:t>Startup text .json</a:t>
+            </a:r>
+          </a:p>
+        </p:txBody>
+      </p:sp>
       <p:cxnSp>
         <p:nvCxnSpPr>
-          <p:cNvPr id="8" name="Straight Arrow Connector 7">
-            <a:extLst>
-              <a:ext uri="{FF2B5EF4-FFF2-40B4-BE49-F238E27FC236}">
-                <a16:creationId xmlns:a16="http://schemas.microsoft.com/office/drawing/2014/main" id="{6314BB30-8734-2718-F4C1-CCABE6A6C07D}"/>
+          <p:cNvPr id="26" name="Straight Arrow Connector 25">
+            <a:extLst>
+              <a:ext uri="{FF2B5EF4-FFF2-40B4-BE49-F238E27FC236}">
+                <a16:creationId xmlns:a16="http://schemas.microsoft.com/office/drawing/2014/main" id="{78D1E7A4-00BB-E8C1-5E9C-BF6D4CA3BA06}"/>
               </a:ext>
             </a:extLst>
           </p:cNvPr>
           <p:cNvCxnSpPr>
             <a:cxnSpLocks/>
-            <a:stCxn id="12" idx="2"/>
-            <a:endCxn id="3" idx="0"/>
+            <a:stCxn id="13" idx="3"/>
+            <a:endCxn id="23" idx="1"/>
           </p:cNvCxnSpPr>
           <p:nvPr/>
         </p:nvCxnSpPr>
         <p:spPr>
-          <a:xfrm flipH="1">
-            <a:off x="4078691" y="3878929"/>
-            <a:ext cx="1" cy="594675"/>
+          <a:xfrm>
+            <a:off x="5534892" y="2766928"/>
+            <a:ext cx="913015" cy="600079"/>
+          </a:xfrm>
+          <a:prstGeom prst="straightConnector1">
+            <a:avLst/>
+          </a:prstGeom>
+          <a:ln>
+            <a:solidFill>
+              <a:schemeClr val="tx1">
+                <a:lumMod val="95000"/>
+                <a:lumOff val="5000"/>
+              </a:schemeClr>
+            </a:solidFill>
+            <a:tailEnd type="triangle"/>
+          </a:ln>
+        </p:spPr>
+        <p:style>
+          <a:lnRef idx="1">
+            <a:schemeClr val="accent1"/>
+          </a:lnRef>
+          <a:fillRef idx="0">
+            <a:schemeClr val="accent1"/>
+          </a:fillRef>
+          <a:effectRef idx="0">
+            <a:schemeClr val="accent1"/>
+          </a:effectRef>
+          <a:fontRef idx="minor">
+            <a:schemeClr val="tx1"/>
+          </a:fontRef>
+        </p:style>
+      </p:cxnSp>
+      <p:cxnSp>
+        <p:nvCxnSpPr>
+          <p:cNvPr id="31" name="Straight Arrow Connector 30">
+            <a:extLst>
+              <a:ext uri="{FF2B5EF4-FFF2-40B4-BE49-F238E27FC236}">
+                <a16:creationId xmlns:a16="http://schemas.microsoft.com/office/drawing/2014/main" id="{86E93D58-FD28-BF9F-BCA0-19589657B341}"/>
+              </a:ext>
+            </a:extLst>
+          </p:cNvPr>
+          <p:cNvCxnSpPr>
+            <a:cxnSpLocks/>
+            <a:stCxn id="23" idx="3"/>
+            <a:endCxn id="16" idx="1"/>
+          </p:cNvCxnSpPr>
+          <p:nvPr/>
+        </p:nvCxnSpPr>
+        <p:spPr>
+          <a:xfrm>
+            <a:off x="7283336" y="3367007"/>
+            <a:ext cx="1177635" cy="0"/>
           </a:xfrm>
           <a:prstGeom prst="straightConnector1">
             <a:avLst/>

</xml_diff>